<commit_message>
Comentarios en archivo 7 - Etapa de la justificación
</commit_message>
<xml_diff>
--- a/7 - Etapa de la justificación.pptx
+++ b/7 - Etapa de la justificación.pptx
@@ -111,6 +111,22 @@
       </a:defRPr>
     </a:lvl9pPr>
   </p:defaultTextStyle>
+  <p:extLst>
+    <p:ext uri="{EFAFB233-063F-42B5-8137-9DF3F51BA10A}">
+      <p15:sldGuideLst xmlns:p15="http://schemas.microsoft.com/office/powerpoint/2012/main">
+        <p15:guide id="1" orient="horz" pos="2160">
+          <p15:clr>
+            <a:srgbClr val="A4A3A4"/>
+          </p15:clr>
+        </p15:guide>
+        <p15:guide id="2" pos="2880">
+          <p15:clr>
+            <a:srgbClr val="A4A3A4"/>
+          </p15:clr>
+        </p15:guide>
+      </p15:sldGuideLst>
+    </p:ext>
+  </p:extLst>
 </p:presentation>
 </file>
 
@@ -3375,6 +3391,13 @@
   <p:clrMapOvr>
     <a:masterClrMapping/>
   </p:clrMapOvr>
+  <p:timing>
+    <p:tnLst>
+      <p:par>
+        <p:cTn id="1" dur="indefinite" restart="never" nodeType="tmRoot"/>
+      </p:par>
+    </p:tnLst>
+  </p:timing>
 </p:sld>
 </file>
 
@@ -3494,6 +3517,13 @@
   <p:clrMapOvr>
     <a:masterClrMapping/>
   </p:clrMapOvr>
+  <p:timing>
+    <p:tnLst>
+      <p:par>
+        <p:cTn id="1" dur="indefinite" restart="never" nodeType="tmRoot"/>
+      </p:par>
+    </p:tnLst>
+  </p:timing>
 </p:sld>
 </file>
 
@@ -3646,6 +3676,13 @@
   <p:clrMapOvr>
     <a:masterClrMapping/>
   </p:clrMapOvr>
+  <p:timing>
+    <p:tnLst>
+      <p:par>
+        <p:cTn id="1" dur="indefinite" restart="never" nodeType="tmRoot"/>
+      </p:par>
+    </p:tnLst>
+  </p:timing>
 </p:sld>
 </file>
 
@@ -3809,6 +3846,13 @@
   <p:clrMapOvr>
     <a:masterClrMapping/>
   </p:clrMapOvr>
+  <p:timing>
+    <p:tnLst>
+      <p:par>
+        <p:cTn id="1" dur="indefinite" restart="never" nodeType="tmRoot"/>
+      </p:par>
+    </p:tnLst>
+  </p:timing>
 </p:sld>
 </file>
 
@@ -3943,6 +3987,13 @@
   <p:clrMapOvr>
     <a:masterClrMapping/>
   </p:clrMapOvr>
+  <p:timing>
+    <p:tnLst>
+      <p:par>
+        <p:cTn id="1" dur="indefinite" restart="never" nodeType="tmRoot"/>
+      </p:par>
+    </p:tnLst>
+  </p:timing>
 </p:sld>
 </file>
 
@@ -4171,6 +4222,13 @@
   <p:clrMapOvr>
     <a:masterClrMapping/>
   </p:clrMapOvr>
+  <p:timing>
+    <p:tnLst>
+      <p:par>
+        <p:cTn id="1" dur="indefinite" restart="never" nodeType="tmRoot"/>
+      </p:par>
+    </p:tnLst>
+  </p:timing>
 </p:sld>
 </file>
 
@@ -4400,6 +4458,13 @@
   <p:clrMapOvr>
     <a:masterClrMapping/>
   </p:clrMapOvr>
+  <p:timing>
+    <p:tnLst>
+      <p:par>
+        <p:cTn id="1" dur="indefinite" restart="never" nodeType="tmRoot"/>
+      </p:par>
+    </p:tnLst>
+  </p:timing>
 </p:sld>
 </file>
 
@@ -4472,7 +4537,7 @@
         </p:nvSpPr>
         <p:spPr>
           <a:xfrm>
-            <a:off x="539552" y="1412776"/>
+            <a:off x="539552" y="1072823"/>
             <a:ext cx="8229600" cy="1143000"/>
           </a:xfrm>
           <a:prstGeom prst="rect">
@@ -4511,11 +4576,12 @@
             </a:r>
             <a:r>
               <a:rPr lang="es-MX" sz="2800" dirty="0" smtClean="0"/>
-              <a:t>: interesantes temas para investigar, ojala encuentres información y la puedas acomodar.</a:t>
-            </a:r>
-            <a:br>
+              <a:t>: interesantes temas para investigar, ojala encuentres información y la puedas acomodar</a:t>
+            </a:r>
+            <a:r>
               <a:rPr lang="es-MX" sz="2800" dirty="0" smtClean="0"/>
-            </a:br>
+              <a:t>.</a:t>
+            </a:r>
             <a:endParaRPr lang="es-MX" sz="2800" dirty="0"/>
           </a:p>
         </p:txBody>
@@ -4530,7 +4596,7 @@
         </p:nvSpPr>
         <p:spPr>
           <a:xfrm>
-            <a:off x="539552" y="2596952"/>
+            <a:off x="522161" y="1988840"/>
             <a:ext cx="8229600" cy="1143000"/>
           </a:xfrm>
           <a:prstGeom prst="rect">
@@ -4612,7 +4678,7 @@
         </p:nvSpPr>
         <p:spPr>
           <a:xfrm>
-            <a:off x="539552" y="3573016"/>
+            <a:off x="541805" y="2951536"/>
             <a:ext cx="8229600" cy="1143000"/>
           </a:xfrm>
           <a:prstGeom prst="rect">
@@ -4670,7 +4736,7 @@
         </p:nvSpPr>
         <p:spPr>
           <a:xfrm>
-            <a:off x="539552" y="4144516"/>
+            <a:off x="539552" y="3626379"/>
             <a:ext cx="8229600" cy="1143000"/>
           </a:xfrm>
           <a:prstGeom prst="rect">
@@ -4729,7 +4795,7 @@
         <p:spPr>
           <a:xfrm>
             <a:off x="539552" y="5287516"/>
-            <a:ext cx="8229600" cy="1143000"/>
+            <a:ext cx="8229600" cy="1453852"/>
           </a:xfrm>
           <a:prstGeom prst="rect">
             <a:avLst/>
@@ -4767,11 +4833,38 @@
             </a:r>
             <a:r>
               <a:rPr lang="es-MX" sz="2800" dirty="0" smtClean="0"/>
+              <a:t>: compañeros que paso pues</a:t>
+            </a:r>
+            <a:r>
+              <a:rPr lang="es-MX" sz="2800" dirty="0" smtClean="0"/>
+              <a:t>…</a:t>
+            </a:r>
+          </a:p>
+          <a:p>
+            <a:pPr algn="l"/>
+            <a:r>
+              <a:rPr lang="es-MX" sz="2800" smtClean="0">
+                <a:solidFill>
+                  <a:srgbClr val="FF0000"/>
+                </a:solidFill>
+              </a:rPr>
+              <a:t>Javier Lizárraga</a:t>
+            </a:r>
+            <a:r>
+              <a:rPr lang="es-MX" sz="2800" smtClean="0"/>
               <a:t>: </a:t>
             </a:r>
             <a:r>
               <a:rPr lang="es-MX" sz="2800" dirty="0" smtClean="0"/>
-              <a:t>compañeros que paso pues…</a:t>
+              <a:t>Es bueno saber porque nuestra carrera tiene justificación en el mercado. Muy interesante.</a:t>
+            </a:r>
+            <a:endParaRPr lang="es-MX" sz="2800" dirty="0"/>
+          </a:p>
+          <a:p>
+            <a:pPr algn="l"/>
+            <a:r>
+              <a:rPr lang="es-MX" sz="2800" dirty="0" smtClean="0"/>
+              <a:t/>
             </a:r>
             <a:br>
               <a:rPr lang="es-MX" sz="2800" dirty="0" smtClean="0"/>
@@ -4788,7 +4881,7 @@
         </p:nvSpPr>
         <p:spPr>
           <a:xfrm>
-            <a:off x="642910" y="4857760"/>
+            <a:off x="611560" y="4279038"/>
             <a:ext cx="6429420" cy="369332"/>
           </a:xfrm>
           <a:prstGeom prst="rect">
@@ -4832,6 +4925,13 @@
   <p:clrMapOvr>
     <a:masterClrMapping/>
   </p:clrMapOvr>
+  <p:timing>
+    <p:tnLst>
+      <p:par>
+        <p:cTn id="1" dur="indefinite" restart="never" nodeType="tmRoot"/>
+      </p:par>
+    </p:tnLst>
+  </p:timing>
 </p:sld>
 </file>
 

</xml_diff>